<commit_message>
explaining each SA task.
</commit_message>
<xml_diff>
--- a/thesis/figures/sentiment_analysis_approaches.pptx
+++ b/thesis/figures/sentiment_analysis_approaches.pptx
@@ -104,6 +104,11 @@
       </a:defRPr>
     </a:lvl9pPr>
   </p:defaultTextStyle>
+  <p:extLst>
+    <p:ext uri="{EFAFB233-063F-42B5-8137-9DF3F51BA10A}">
+      <p15:sldGuideLst xmlns:p15="http://schemas.microsoft.com/office/powerpoint/2012/main"/>
+    </p:ext>
+  </p:extLst>
 </p:presentation>
 </file>
 
@@ -238,7 +243,7 @@
           <a:p>
             <a:fld id="{7E2F3544-8B26-024D-BBA2-EF776D38F430}" type="datetimeFigureOut">
               <a:rPr lang="en-US" smtClean="0"/>
-              <a:t>3/10/17</a:t>
+              <a:t>3/11/17</a:t>
             </a:fld>
             <a:endParaRPr lang="en-US"/>
           </a:p>
@@ -408,7 +413,7 @@
           <a:p>
             <a:fld id="{7E2F3544-8B26-024D-BBA2-EF776D38F430}" type="datetimeFigureOut">
               <a:rPr lang="en-US" smtClean="0"/>
-              <a:t>3/10/17</a:t>
+              <a:t>3/11/17</a:t>
             </a:fld>
             <a:endParaRPr lang="en-US"/>
           </a:p>
@@ -588,7 +593,7 @@
           <a:p>
             <a:fld id="{7E2F3544-8B26-024D-BBA2-EF776D38F430}" type="datetimeFigureOut">
               <a:rPr lang="en-US" smtClean="0"/>
-              <a:t>3/10/17</a:t>
+              <a:t>3/11/17</a:t>
             </a:fld>
             <a:endParaRPr lang="en-US"/>
           </a:p>
@@ -758,7 +763,7 @@
           <a:p>
             <a:fld id="{7E2F3544-8B26-024D-BBA2-EF776D38F430}" type="datetimeFigureOut">
               <a:rPr lang="en-US" smtClean="0"/>
-              <a:t>3/10/17</a:t>
+              <a:t>3/11/17</a:t>
             </a:fld>
             <a:endParaRPr lang="en-US"/>
           </a:p>
@@ -1004,7 +1009,7 @@
           <a:p>
             <a:fld id="{7E2F3544-8B26-024D-BBA2-EF776D38F430}" type="datetimeFigureOut">
               <a:rPr lang="en-US" smtClean="0"/>
-              <a:t>3/10/17</a:t>
+              <a:t>3/11/17</a:t>
             </a:fld>
             <a:endParaRPr lang="en-US"/>
           </a:p>
@@ -1236,7 +1241,7 @@
           <a:p>
             <a:fld id="{7E2F3544-8B26-024D-BBA2-EF776D38F430}" type="datetimeFigureOut">
               <a:rPr lang="en-US" smtClean="0"/>
-              <a:t>3/10/17</a:t>
+              <a:t>3/11/17</a:t>
             </a:fld>
             <a:endParaRPr lang="en-US"/>
           </a:p>
@@ -1603,7 +1608,7 @@
           <a:p>
             <a:fld id="{7E2F3544-8B26-024D-BBA2-EF776D38F430}" type="datetimeFigureOut">
               <a:rPr lang="en-US" smtClean="0"/>
-              <a:t>3/10/17</a:t>
+              <a:t>3/11/17</a:t>
             </a:fld>
             <a:endParaRPr lang="en-US"/>
           </a:p>
@@ -1721,7 +1726,7 @@
           <a:p>
             <a:fld id="{7E2F3544-8B26-024D-BBA2-EF776D38F430}" type="datetimeFigureOut">
               <a:rPr lang="en-US" smtClean="0"/>
-              <a:t>3/10/17</a:t>
+              <a:t>3/11/17</a:t>
             </a:fld>
             <a:endParaRPr lang="en-US"/>
           </a:p>
@@ -1816,7 +1821,7 @@
           <a:p>
             <a:fld id="{7E2F3544-8B26-024D-BBA2-EF776D38F430}" type="datetimeFigureOut">
               <a:rPr lang="en-US" smtClean="0"/>
-              <a:t>3/10/17</a:t>
+              <a:t>3/11/17</a:t>
             </a:fld>
             <a:endParaRPr lang="en-US"/>
           </a:p>
@@ -2093,7 +2098,7 @@
           <a:p>
             <a:fld id="{7E2F3544-8B26-024D-BBA2-EF776D38F430}" type="datetimeFigureOut">
               <a:rPr lang="en-US" smtClean="0"/>
-              <a:t>3/10/17</a:t>
+              <a:t>3/11/17</a:t>
             </a:fld>
             <a:endParaRPr lang="en-US"/>
           </a:p>
@@ -2346,7 +2351,7 @@
           <a:p>
             <a:fld id="{7E2F3544-8B26-024D-BBA2-EF776D38F430}" type="datetimeFigureOut">
               <a:rPr lang="en-US" smtClean="0"/>
-              <a:t>3/10/17</a:t>
+              <a:t>3/11/17</a:t>
             </a:fld>
             <a:endParaRPr lang="en-US"/>
           </a:p>
@@ -2559,7 +2564,7 @@
           <a:p>
             <a:fld id="{7E2F3544-8B26-024D-BBA2-EF776D38F430}" type="datetimeFigureOut">
               <a:rPr lang="en-US" smtClean="0"/>
-              <a:t>3/10/17</a:t>
+              <a:t>3/11/17</a:t>
             </a:fld>
             <a:endParaRPr lang="en-US"/>
           </a:p>
@@ -3030,7 +3035,7 @@
         </p:nvSpPr>
         <p:spPr>
           <a:xfrm>
-            <a:off x="4376150" y="1511820"/>
+            <a:off x="4376150" y="1032076"/>
             <a:ext cx="1536700" cy="487028"/>
           </a:xfrm>
           <a:prstGeom prst="roundRect">
@@ -3088,7 +3093,7 @@
         </p:nvSpPr>
         <p:spPr>
           <a:xfrm>
-            <a:off x="4376150" y="2547284"/>
+            <a:off x="4376150" y="1593212"/>
             <a:ext cx="1536700" cy="736080"/>
           </a:xfrm>
           <a:prstGeom prst="roundRect">
@@ -3128,15 +3133,7 @@
                   <a:schemeClr val="tx1"/>
                 </a:solidFill>
               </a:rPr>
-              <a:t>Review </a:t>
-            </a:r>
-            <a:r>
-              <a:rPr lang="en-US" sz="1400" smtClean="0">
-                <a:solidFill>
-                  <a:schemeClr val="tx1"/>
-                </a:solidFill>
-              </a:rPr>
-              <a:t>Usefulness Measurement</a:t>
+              <a:t>Review Usefulness Measurement</a:t>
             </a:r>
             <a:endParaRPr lang="en-US" sz="1400" dirty="0">
               <a:solidFill>
@@ -3154,7 +3151,7 @@
         </p:nvSpPr>
         <p:spPr>
           <a:xfrm>
-            <a:off x="4376150" y="3831800"/>
+            <a:off x="4376150" y="2403400"/>
             <a:ext cx="1536700" cy="487028"/>
           </a:xfrm>
           <a:prstGeom prst="roundRect">
@@ -3189,12 +3186,28 @@
           <a:p>
             <a:pPr algn="ctr"/>
             <a:r>
+              <a:rPr lang="en-US" sz="1400" smtClean="0">
+                <a:solidFill>
+                  <a:schemeClr val="tx1"/>
+                </a:solidFill>
+              </a:rPr>
+              <a:t>Opinion </a:t>
+            </a:r>
+            <a:r>
+              <a:rPr lang="en-US" sz="1400" smtClean="0">
+                <a:solidFill>
+                  <a:schemeClr val="tx1"/>
+                </a:solidFill>
+              </a:rPr>
+              <a:t>Spam </a:t>
+            </a:r>
+            <a:r>
               <a:rPr lang="en-US" sz="1400" dirty="0" smtClean="0">
                 <a:solidFill>
                   <a:schemeClr val="tx1"/>
                 </a:solidFill>
               </a:rPr>
-              <a:t>Opinion Span Detection</a:t>
+              <a:t>Detection</a:t>
             </a:r>
             <a:endParaRPr lang="en-US" sz="1400" dirty="0">
               <a:solidFill>
@@ -3212,7 +3225,7 @@
         </p:nvSpPr>
         <p:spPr>
           <a:xfrm>
-            <a:off x="4376150" y="4867264"/>
+            <a:off x="9011650" y="1159634"/>
             <a:ext cx="1536700" cy="487028"/>
           </a:xfrm>
           <a:prstGeom prst="roundRect">
@@ -3270,7 +3283,7 @@
         </p:nvSpPr>
         <p:spPr>
           <a:xfrm>
-            <a:off x="4376150" y="5902728"/>
+            <a:off x="9011650" y="1726308"/>
             <a:ext cx="1536700" cy="487028"/>
           </a:xfrm>
           <a:prstGeom prst="roundRect">
@@ -3329,7 +3342,7 @@
         <p:spPr>
           <a:xfrm flipH="1">
             <a:off x="3659600" y="470940"/>
-            <a:ext cx="467900" cy="3847888"/>
+            <a:ext cx="467900" cy="2419488"/>
           </a:xfrm>
           <a:prstGeom prst="rightBrace">
             <a:avLst>
@@ -3374,8 +3387,8 @@
         </p:nvSpPr>
         <p:spPr>
           <a:xfrm flipH="1">
-            <a:off x="3659600" y="4867264"/>
-            <a:ext cx="467900" cy="1522492"/>
+            <a:off x="8295100" y="1159634"/>
+            <a:ext cx="493300" cy="1053702"/>
           </a:xfrm>
           <a:prstGeom prst="rightBrace">
             <a:avLst/>
@@ -3418,13 +3431,13 @@
           <p:nvPr>
             <p:extLst>
               <p:ext uri="{D42A27DB-BD31-4B8C-83A1-F6EECF244321}">
-                <p14:modId xmlns:p14="http://schemas.microsoft.com/office/powerpoint/2010/main" val="1191699724"/>
+                <p14:modId xmlns:p14="http://schemas.microsoft.com/office/powerpoint/2010/main" val="788971131"/>
               </p:ext>
             </p:extLst>
           </p:nvPr>
         </p:nvGraphicFramePr>
         <p:xfrm>
-          <a:off x="2156325" y="1691304"/>
+          <a:off x="2156325" y="977104"/>
           <a:ext cx="1378950" cy="1407160"/>
         </p:xfrm>
         <a:graphic>
@@ -3650,13 +3663,13 @@
           <p:nvPr>
             <p:extLst>
               <p:ext uri="{D42A27DB-BD31-4B8C-83A1-F6EECF244321}">
-                <p14:modId xmlns:p14="http://schemas.microsoft.com/office/powerpoint/2010/main" val="252211214"/>
+                <p14:modId xmlns:p14="http://schemas.microsoft.com/office/powerpoint/2010/main" val="1642790462"/>
               </p:ext>
             </p:extLst>
           </p:nvPr>
         </p:nvGraphicFramePr>
         <p:xfrm>
-          <a:off x="2183400" y="5110778"/>
+          <a:off x="6780800" y="1164614"/>
           <a:ext cx="1378950" cy="1061422"/>
         </p:xfrm>
         <a:graphic>

</xml_diff>